<commit_message>
add resource for applying to the store
</commit_message>
<xml_diff>
--- a/store_resources/icon.pptx
+++ b/store_resources/icon.pptx
@@ -6,6 +6,7 @@
   </p:sldMasterIdLst>
   <p:sldIdLst>
     <p:sldId id="257" r:id="rId2"/>
+    <p:sldId id="258" r:id="rId3"/>
   </p:sldIdLst>
   <p:sldSz cx="12192000" cy="6858000"/>
   <p:notesSz cx="6858000" cy="9144000"/>
@@ -259,7 +260,7 @@
           <a:p>
             <a:fld id="{2773BD2B-BBA2-4957-9F22-05F0BF8F1024}" type="datetimeFigureOut">
               <a:rPr lang="en-US" smtClean="0"/>
-              <a:t>10/26/2020</a:t>
+              <a:t>10/28/2020</a:t>
             </a:fld>
             <a:endParaRPr lang="en-US"/>
           </a:p>
@@ -457,7 +458,7 @@
           <a:p>
             <a:fld id="{2773BD2B-BBA2-4957-9F22-05F0BF8F1024}" type="datetimeFigureOut">
               <a:rPr lang="en-US" smtClean="0"/>
-              <a:t>10/26/2020</a:t>
+              <a:t>10/28/2020</a:t>
             </a:fld>
             <a:endParaRPr lang="en-US"/>
           </a:p>
@@ -665,7 +666,7 @@
           <a:p>
             <a:fld id="{2773BD2B-BBA2-4957-9F22-05F0BF8F1024}" type="datetimeFigureOut">
               <a:rPr lang="en-US" smtClean="0"/>
-              <a:t>10/26/2020</a:t>
+              <a:t>10/28/2020</a:t>
             </a:fld>
             <a:endParaRPr lang="en-US"/>
           </a:p>
@@ -863,7 +864,7 @@
           <a:p>
             <a:fld id="{2773BD2B-BBA2-4957-9F22-05F0BF8F1024}" type="datetimeFigureOut">
               <a:rPr lang="en-US" smtClean="0"/>
-              <a:t>10/26/2020</a:t>
+              <a:t>10/28/2020</a:t>
             </a:fld>
             <a:endParaRPr lang="en-US"/>
           </a:p>
@@ -1138,7 +1139,7 @@
           <a:p>
             <a:fld id="{2773BD2B-BBA2-4957-9F22-05F0BF8F1024}" type="datetimeFigureOut">
               <a:rPr lang="en-US" smtClean="0"/>
-              <a:t>10/26/2020</a:t>
+              <a:t>10/28/2020</a:t>
             </a:fld>
             <a:endParaRPr lang="en-US"/>
           </a:p>
@@ -1403,7 +1404,7 @@
           <a:p>
             <a:fld id="{2773BD2B-BBA2-4957-9F22-05F0BF8F1024}" type="datetimeFigureOut">
               <a:rPr lang="en-US" smtClean="0"/>
-              <a:t>10/26/2020</a:t>
+              <a:t>10/28/2020</a:t>
             </a:fld>
             <a:endParaRPr lang="en-US"/>
           </a:p>
@@ -1815,7 +1816,7 @@
           <a:p>
             <a:fld id="{2773BD2B-BBA2-4957-9F22-05F0BF8F1024}" type="datetimeFigureOut">
               <a:rPr lang="en-US" smtClean="0"/>
-              <a:t>10/26/2020</a:t>
+              <a:t>10/28/2020</a:t>
             </a:fld>
             <a:endParaRPr lang="en-US"/>
           </a:p>
@@ -1956,7 +1957,7 @@
           <a:p>
             <a:fld id="{2773BD2B-BBA2-4957-9F22-05F0BF8F1024}" type="datetimeFigureOut">
               <a:rPr lang="en-US" smtClean="0"/>
-              <a:t>10/26/2020</a:t>
+              <a:t>10/28/2020</a:t>
             </a:fld>
             <a:endParaRPr lang="en-US"/>
           </a:p>
@@ -2069,7 +2070,7 @@
           <a:p>
             <a:fld id="{2773BD2B-BBA2-4957-9F22-05F0BF8F1024}" type="datetimeFigureOut">
               <a:rPr lang="en-US" smtClean="0"/>
-              <a:t>10/26/2020</a:t>
+              <a:t>10/28/2020</a:t>
             </a:fld>
             <a:endParaRPr lang="en-US"/>
           </a:p>
@@ -2380,7 +2381,7 @@
           <a:p>
             <a:fld id="{2773BD2B-BBA2-4957-9F22-05F0BF8F1024}" type="datetimeFigureOut">
               <a:rPr lang="en-US" smtClean="0"/>
-              <a:t>10/26/2020</a:t>
+              <a:t>10/28/2020</a:t>
             </a:fld>
             <a:endParaRPr lang="en-US"/>
           </a:p>
@@ -2668,7 +2669,7 @@
           <a:p>
             <a:fld id="{2773BD2B-BBA2-4957-9F22-05F0BF8F1024}" type="datetimeFigureOut">
               <a:rPr lang="en-US" smtClean="0"/>
-              <a:t>10/26/2020</a:t>
+              <a:t>10/28/2020</a:t>
             </a:fld>
             <a:endParaRPr lang="en-US"/>
           </a:p>
@@ -2909,7 +2910,7 @@
           <a:p>
             <a:fld id="{2773BD2B-BBA2-4957-9F22-05F0BF8F1024}" type="datetimeFigureOut">
               <a:rPr lang="en-US" smtClean="0"/>
-              <a:t>10/26/2020</a:t>
+              <a:t>10/28/2020</a:t>
             </a:fld>
             <a:endParaRPr lang="en-US"/>
           </a:p>
@@ -3444,6 +3445,134 @@
 </p:sld>
 </file>
 
+<file path=ppt/slides/slide2.xml><?xml version="1.0" encoding="utf-8"?>
+<p:sld xmlns:a="http://schemas.openxmlformats.org/drawingml/2006/main" xmlns:r="http://schemas.openxmlformats.org/officeDocument/2006/relationships" xmlns:p="http://schemas.openxmlformats.org/presentationml/2006/main">
+  <p:cSld>
+    <p:spTree>
+      <p:nvGrpSpPr>
+        <p:cNvPr id="1" name=""/>
+        <p:cNvGrpSpPr/>
+        <p:nvPr/>
+      </p:nvGrpSpPr>
+      <p:grpSpPr>
+        <a:xfrm>
+          <a:off x="0" y="0"/>
+          <a:ext cx="0" cy="0"/>
+          <a:chOff x="0" y="0"/>
+          <a:chExt cx="0" cy="0"/>
+        </a:xfrm>
+      </p:grpSpPr>
+      <p:grpSp>
+        <p:nvGrpSpPr>
+          <p:cNvPr id="7" name="Group 6">
+            <a:extLst>
+              <a:ext uri="{FF2B5EF4-FFF2-40B4-BE49-F238E27FC236}">
+                <a16:creationId xmlns:a16="http://schemas.microsoft.com/office/drawing/2014/main" id="{70747464-F9A5-4DB1-963D-E10BFCD92A5A}"/>
+              </a:ext>
+            </a:extLst>
+          </p:cNvPr>
+          <p:cNvGrpSpPr/>
+          <p:nvPr/>
+        </p:nvGrpSpPr>
+        <p:grpSpPr>
+          <a:xfrm>
+            <a:off x="2526232" y="939626"/>
+            <a:ext cx="5852160" cy="3657600"/>
+            <a:chOff x="2526232" y="939626"/>
+            <a:chExt cx="5852160" cy="3657600"/>
+          </a:xfrm>
+        </p:grpSpPr>
+        <p:sp>
+          <p:nvSpPr>
+            <p:cNvPr id="4" name="Rectangle 3">
+              <a:extLst>
+                <a:ext uri="{FF2B5EF4-FFF2-40B4-BE49-F238E27FC236}">
+                  <a16:creationId xmlns:a16="http://schemas.microsoft.com/office/drawing/2014/main" id="{6AC49334-93AA-4008-8C87-8C71F47D45BA}"/>
+                </a:ext>
+              </a:extLst>
+            </p:cNvPr>
+            <p:cNvSpPr/>
+            <p:nvPr/>
+          </p:nvSpPr>
+          <p:spPr>
+            <a:xfrm>
+              <a:off x="2526232" y="939626"/>
+              <a:ext cx="5852160" cy="3657600"/>
+            </a:xfrm>
+            <a:prstGeom prst="rect">
+              <a:avLst/>
+            </a:prstGeom>
+            <a:noFill/>
+          </p:spPr>
+          <p:style>
+            <a:lnRef idx="2">
+              <a:schemeClr val="accent1">
+                <a:shade val="50000"/>
+              </a:schemeClr>
+            </a:lnRef>
+            <a:fillRef idx="1">
+              <a:schemeClr val="accent1"/>
+            </a:fillRef>
+            <a:effectRef idx="0">
+              <a:schemeClr val="accent1"/>
+            </a:effectRef>
+            <a:fontRef idx="minor">
+              <a:schemeClr val="lt1"/>
+            </a:fontRef>
+          </p:style>
+          <p:txBody>
+            <a:bodyPr rtlCol="0" anchor="ctr"/>
+            <a:lstStyle/>
+            <a:p>
+              <a:pPr algn="ctr"/>
+              <a:endParaRPr lang="en-US"/>
+            </a:p>
+          </p:txBody>
+        </p:sp>
+        <p:pic>
+          <p:nvPicPr>
+            <p:cNvPr id="5" name="Picture 4">
+              <a:extLst>
+                <a:ext uri="{FF2B5EF4-FFF2-40B4-BE49-F238E27FC236}">
+                  <a16:creationId xmlns:a16="http://schemas.microsoft.com/office/drawing/2014/main" id="{24A1BA76-0637-4E70-8441-1CB9AD681241}"/>
+                </a:ext>
+              </a:extLst>
+            </p:cNvPr>
+            <p:cNvPicPr>
+              <a:picLocks noChangeAspect="1"/>
+            </p:cNvPicPr>
+            <p:nvPr/>
+          </p:nvPicPr>
+          <p:blipFill>
+            <a:blip r:embed="rId2"/>
+            <a:stretch>
+              <a:fillRect/>
+            </a:stretch>
+          </p:blipFill>
+          <p:spPr>
+            <a:xfrm>
+              <a:off x="2526232" y="939626"/>
+              <a:ext cx="2204581" cy="3657600"/>
+            </a:xfrm>
+            <a:prstGeom prst="rect">
+              <a:avLst/>
+            </a:prstGeom>
+          </p:spPr>
+        </p:pic>
+      </p:grpSp>
+    </p:spTree>
+    <p:extLst>
+      <p:ext uri="{BB962C8B-B14F-4D97-AF65-F5344CB8AC3E}">
+        <p14:creationId xmlns:p14="http://schemas.microsoft.com/office/powerpoint/2010/main" val="283642246"/>
+      </p:ext>
+    </p:extLst>
+  </p:cSld>
+  <p:clrMapOvr>
+    <a:masterClrMapping/>
+  </p:clrMapOvr>
+</p:sld>
+</file>
+
 <file path=ppt/theme/theme1.xml><?xml version="1.0" encoding="utf-8"?>
 <a:theme xmlns:a="http://schemas.openxmlformats.org/drawingml/2006/main" name="Office Theme">
   <a:themeElements>

</xml_diff>